<commit_message>
new figure for experiment procedure and a bit more das papier
</commit_message>
<xml_diff>
--- a/Experiments/Experiment 2/src/resources/procedure.pptx
+++ b/Experiments/Experiment 2/src/resources/procedure.pptx
@@ -105,6 +105,11 @@
       </a:defRPr>
     </a:lvl9pPr>
   </p:defaultTextStyle>
+  <p:extLst>
+    <p:ext uri="{EFAFB233-063F-42B5-8137-9DF3F51BA10A}">
+      <p15:sldGuideLst xmlns:p15="http://schemas.microsoft.com/office/powerpoint/2012/main"/>
+    </p:ext>
+  </p:extLst>
 </p:presentation>
 </file>
 
@@ -239,7 +244,7 @@
           <a:p>
             <a:fld id="{9696521B-36EB-4EBA-9025-89831F60C181}" type="datetimeFigureOut">
               <a:rPr lang="zh-TW" altLang="en-US" smtClean="0"/>
-              <a:t>2016/11/16</a:t>
+              <a:t>2017/6/2</a:t>
             </a:fld>
             <a:endParaRPr lang="zh-TW" altLang="en-US"/>
           </a:p>
@@ -409,7 +414,7 @@
           <a:p>
             <a:fld id="{9696521B-36EB-4EBA-9025-89831F60C181}" type="datetimeFigureOut">
               <a:rPr lang="zh-TW" altLang="en-US" smtClean="0"/>
-              <a:t>2016/11/16</a:t>
+              <a:t>2017/6/2</a:t>
             </a:fld>
             <a:endParaRPr lang="zh-TW" altLang="en-US"/>
           </a:p>
@@ -589,7 +594,7 @@
           <a:p>
             <a:fld id="{9696521B-36EB-4EBA-9025-89831F60C181}" type="datetimeFigureOut">
               <a:rPr lang="zh-TW" altLang="en-US" smtClean="0"/>
-              <a:t>2016/11/16</a:t>
+              <a:t>2017/6/2</a:t>
             </a:fld>
             <a:endParaRPr lang="zh-TW" altLang="en-US"/>
           </a:p>
@@ -759,7 +764,7 @@
           <a:p>
             <a:fld id="{9696521B-36EB-4EBA-9025-89831F60C181}" type="datetimeFigureOut">
               <a:rPr lang="zh-TW" altLang="en-US" smtClean="0"/>
-              <a:t>2016/11/16</a:t>
+              <a:t>2017/6/2</a:t>
             </a:fld>
             <a:endParaRPr lang="zh-TW" altLang="en-US"/>
           </a:p>
@@ -1005,7 +1010,7 @@
           <a:p>
             <a:fld id="{9696521B-36EB-4EBA-9025-89831F60C181}" type="datetimeFigureOut">
               <a:rPr lang="zh-TW" altLang="en-US" smtClean="0"/>
-              <a:t>2016/11/16</a:t>
+              <a:t>2017/6/2</a:t>
             </a:fld>
             <a:endParaRPr lang="zh-TW" altLang="en-US"/>
           </a:p>
@@ -1237,7 +1242,7 @@
           <a:p>
             <a:fld id="{9696521B-36EB-4EBA-9025-89831F60C181}" type="datetimeFigureOut">
               <a:rPr lang="zh-TW" altLang="en-US" smtClean="0"/>
-              <a:t>2016/11/16</a:t>
+              <a:t>2017/6/2</a:t>
             </a:fld>
             <a:endParaRPr lang="zh-TW" altLang="en-US"/>
           </a:p>
@@ -1604,7 +1609,7 @@
           <a:p>
             <a:fld id="{9696521B-36EB-4EBA-9025-89831F60C181}" type="datetimeFigureOut">
               <a:rPr lang="zh-TW" altLang="en-US" smtClean="0"/>
-              <a:t>2016/11/16</a:t>
+              <a:t>2017/6/2</a:t>
             </a:fld>
             <a:endParaRPr lang="zh-TW" altLang="en-US"/>
           </a:p>
@@ -1722,7 +1727,7 @@
           <a:p>
             <a:fld id="{9696521B-36EB-4EBA-9025-89831F60C181}" type="datetimeFigureOut">
               <a:rPr lang="zh-TW" altLang="en-US" smtClean="0"/>
-              <a:t>2016/11/16</a:t>
+              <a:t>2017/6/2</a:t>
             </a:fld>
             <a:endParaRPr lang="zh-TW" altLang="en-US"/>
           </a:p>
@@ -1817,7 +1822,7 @@
           <a:p>
             <a:fld id="{9696521B-36EB-4EBA-9025-89831F60C181}" type="datetimeFigureOut">
               <a:rPr lang="zh-TW" altLang="en-US" smtClean="0"/>
-              <a:t>2016/11/16</a:t>
+              <a:t>2017/6/2</a:t>
             </a:fld>
             <a:endParaRPr lang="zh-TW" altLang="en-US"/>
           </a:p>
@@ -2094,7 +2099,7 @@
           <a:p>
             <a:fld id="{9696521B-36EB-4EBA-9025-89831F60C181}" type="datetimeFigureOut">
               <a:rPr lang="zh-TW" altLang="en-US" smtClean="0"/>
-              <a:t>2016/11/16</a:t>
+              <a:t>2017/6/2</a:t>
             </a:fld>
             <a:endParaRPr lang="zh-TW" altLang="en-US"/>
           </a:p>
@@ -2347,7 +2352,7 @@
           <a:p>
             <a:fld id="{9696521B-36EB-4EBA-9025-89831F60C181}" type="datetimeFigureOut">
               <a:rPr lang="zh-TW" altLang="en-US" smtClean="0"/>
-              <a:t>2016/11/16</a:t>
+              <a:t>2017/6/2</a:t>
             </a:fld>
             <a:endParaRPr lang="zh-TW" altLang="en-US"/>
           </a:p>
@@ -2560,7 +2565,7 @@
           <a:p>
             <a:fld id="{9696521B-36EB-4EBA-9025-89831F60C181}" type="datetimeFigureOut">
               <a:rPr lang="zh-TW" altLang="en-US" smtClean="0"/>
-              <a:t>2016/11/16</a:t>
+              <a:t>2017/6/2</a:t>
             </a:fld>
             <a:endParaRPr lang="zh-TW" altLang="en-US"/>
           </a:p>
@@ -2974,9 +2979,9 @@
         <p:grpSpPr>
           <a:xfrm>
             <a:off x="1822310" y="1243434"/>
-            <a:ext cx="9160429" cy="3205846"/>
+            <a:ext cx="9187740" cy="3205846"/>
             <a:chOff x="1822310" y="1243434"/>
-            <a:chExt cx="9160429" cy="3205846"/>
+            <a:chExt cx="9187740" cy="3205846"/>
           </a:xfrm>
         </p:grpSpPr>
         <p:grpSp>
@@ -3939,8 +3944,8 @@
           </p:nvSpPr>
           <p:spPr>
             <a:xfrm>
-              <a:off x="7323980" y="4079948"/>
-              <a:ext cx="3658759" cy="369332"/>
+              <a:off x="7147518" y="4079948"/>
+              <a:ext cx="3862532" cy="369332"/>
             </a:xfrm>
             <a:prstGeom prst="rect">
               <a:avLst/>
@@ -3963,7 +3968,11 @@
               </a:r>
               <a:r>
                 <a:rPr lang="en-US" altLang="zh-TW" dirty="0" smtClean="0"/>
-                <a:t> to finish arrangement</a:t>
+                <a:t> to finish </a:t>
+              </a:r>
+              <a:r>
+                <a:rPr lang="en-US" altLang="zh-TW" dirty="0" smtClean="0"/>
+                <a:t>rearrangement</a:t>
               </a:r>
               <a:endParaRPr lang="zh-TW" altLang="en-US" dirty="0"/>
             </a:p>

</xml_diff>